<commit_message>
Important tweak delta trap figure
</commit_message>
<xml_diff>
--- a/doc/Y19_delta_trap_trials.pptx
+++ b/doc/Y19_delta_trap_trials.pptx
@@ -3421,8 +3421,8 @@
         </p:nvSpPr>
         <p:spPr>
           <a:xfrm>
-            <a:off x="5820312" y="4623082"/>
-            <a:ext cx="514629" cy="276999"/>
+            <a:off x="5701562" y="4623082"/>
+            <a:ext cx="752130" cy="276999"/>
           </a:xfrm>
           <a:prstGeom prst="rect">
             <a:avLst/>
@@ -3438,7 +3438,7 @@
             <a:pPr algn="ctr"/>
             <a:r>
               <a:rPr lang="en-US" sz="1200" dirty="0"/>
-              <a:t>Delta</a:t>
+              <a:t>Modified</a:t>
             </a:r>
           </a:p>
         </p:txBody>
@@ -3457,8 +3457,8 @@
         </p:nvSpPr>
         <p:spPr>
           <a:xfrm>
-            <a:off x="6474208" y="4623082"/>
-            <a:ext cx="514629" cy="276999"/>
+            <a:off x="6355458" y="4623082"/>
+            <a:ext cx="752130" cy="276999"/>
           </a:xfrm>
           <a:prstGeom prst="rect">
             <a:avLst/>
@@ -3474,7 +3474,7 @@
             <a:pPr algn="ctr"/>
             <a:r>
               <a:rPr lang="en-US" sz="1200" dirty="0"/>
-              <a:t>Delta</a:t>
+              <a:t>Modified</a:t>
             </a:r>
           </a:p>
         </p:txBody>

</xml_diff>